<commit_message>
Updates in the colors of framework.
</commit_message>
<xml_diff>
--- a/AnIntroductionToTerraME/framework/framework.pptx
+++ b/AnIntroductionToTerraME/framework/framework.pptx
@@ -3050,7 +3050,7 @@
             <a:avLst/>
           </a:prstGeom>
           <a:solidFill>
-            <a:srgbClr val="F79747"/>
+            <a:srgbClr val="F9AD6F"/>
           </a:solidFill>
           <a:ln w="63500" cap="sq" cmpd="thickThin">
             <a:solidFill>
@@ -3198,7 +3198,7 @@
             <a:avLst/>
           </a:prstGeom>
           <a:solidFill>
-            <a:srgbClr val="92D050"/>
+            <a:srgbClr val="A7D971"/>
           </a:solidFill>
           <a:ln>
             <a:solidFill>
@@ -3247,10 +3247,7 @@
             <a:avLst/>
           </a:prstGeom>
           <a:solidFill>
-            <a:schemeClr val="accent4">
-              <a:lumMod val="60000"/>
-              <a:lumOff val="40000"/>
-            </a:schemeClr>
+            <a:srgbClr val="C1B3D1"/>
           </a:solidFill>
           <a:ln>
             <a:solidFill>
@@ -3319,6 +3316,9 @@
             <a:chOff x="6444208" y="764704"/>
             <a:chExt cx="2627784" cy="3168352"/>
           </a:xfrm>
+          <a:solidFill>
+            <a:srgbClr val="FFFF9B"/>
+          </a:solidFill>
         </p:grpSpPr>
         <p:sp>
           <p:nvSpPr>
@@ -3334,9 +3334,7 @@
             <a:prstGeom prst="rect">
               <a:avLst/>
             </a:prstGeom>
-            <a:solidFill>
-              <a:srgbClr val="FFFF75"/>
-            </a:solidFill>
+            <a:grpFill/>
             <a:ln w="25400" cap="sq" cmpd="sng">
               <a:solidFill>
                 <a:schemeClr val="tx1"/>
@@ -3487,6 +3485,7 @@
             <a:prstGeom prst="rect">
               <a:avLst/>
             </a:prstGeom>
+            <a:grpFill/>
             <a:ln>
               <a:solidFill>
                 <a:schemeClr val="tx1"/>
@@ -3524,7 +3523,7 @@
               <a:avLst/>
             </a:prstGeom>
             <a:solidFill>
-              <a:srgbClr val="FFFF75"/>
+              <a:srgbClr val="FFFF9B"/>
             </a:solidFill>
             <a:ln w="25400" cap="sq" cmpd="sng">
               <a:solidFill>
@@ -3689,16 +3688,13 @@
         </p:nvGrpSpPr>
         <p:grpSpPr>
           <a:xfrm>
-            <a:off x="5945156" y="4693672"/>
-            <a:ext cx="1180264" cy="1598244"/>
-            <a:chOff x="6272056" y="4653136"/>
-            <a:chExt cx="1180264" cy="1598244"/>
+            <a:off x="5911673" y="4693672"/>
+            <a:ext cx="1213747" cy="1598244"/>
+            <a:chOff x="6238573" y="4653136"/>
+            <a:chExt cx="1213747" cy="1598244"/>
           </a:xfrm>
           <a:solidFill>
-            <a:schemeClr val="accent4">
-              <a:lumMod val="60000"/>
-              <a:lumOff val="40000"/>
-            </a:schemeClr>
+            <a:srgbClr val="C1B3D1"/>
           </a:solidFill>
         </p:grpSpPr>
         <p:sp>
@@ -3767,7 +3763,7 @@
           </p:nvSpPr>
           <p:spPr>
             <a:xfrm>
-              <a:off x="6386268" y="4763332"/>
+              <a:off x="6386268" y="4768679"/>
               <a:ext cx="936104" cy="1368152"/>
             </a:xfrm>
             <a:prstGeom prst="can">
@@ -3825,7 +3821,7 @@
           </p:nvSpPr>
           <p:spPr>
             <a:xfrm>
-              <a:off x="6272056" y="4883228"/>
+              <a:off x="6238573" y="4883228"/>
               <a:ext cx="936104" cy="1368152"/>
             </a:xfrm>
             <a:prstGeom prst="can">

</xml_diff>